<commit_message>
Added information pulser performance, added appendix with drawings and updates to several parts of the manual.
</commit_message>
<xml_diff>
--- a/figures/controlbox.pptx
+++ b/figures/controlbox.pptx
@@ -254,7 +254,7 @@
           <a:p>
             <a:fld id="{336211AB-35C1-4A8D-948B-57E0E9B10953}" type="datetimeFigureOut">
               <a:rPr lang="en-GB" smtClean="0"/>
-              <a:t>19/03/2019</a:t>
+              <a:t>20/03/2019</a:t>
             </a:fld>
             <a:endParaRPr lang="en-GB"/>
           </a:p>
@@ -424,7 +424,7 @@
           <a:p>
             <a:fld id="{336211AB-35C1-4A8D-948B-57E0E9B10953}" type="datetimeFigureOut">
               <a:rPr lang="en-GB" smtClean="0"/>
-              <a:t>19/03/2019</a:t>
+              <a:t>20/03/2019</a:t>
             </a:fld>
             <a:endParaRPr lang="en-GB"/>
           </a:p>
@@ -604,7 +604,7 @@
           <a:p>
             <a:fld id="{336211AB-35C1-4A8D-948B-57E0E9B10953}" type="datetimeFigureOut">
               <a:rPr lang="en-GB" smtClean="0"/>
-              <a:t>19/03/2019</a:t>
+              <a:t>20/03/2019</a:t>
             </a:fld>
             <a:endParaRPr lang="en-GB"/>
           </a:p>
@@ -774,7 +774,7 @@
           <a:p>
             <a:fld id="{336211AB-35C1-4A8D-948B-57E0E9B10953}" type="datetimeFigureOut">
               <a:rPr lang="en-GB" smtClean="0"/>
-              <a:t>19/03/2019</a:t>
+              <a:t>20/03/2019</a:t>
             </a:fld>
             <a:endParaRPr lang="en-GB"/>
           </a:p>
@@ -1018,7 +1018,7 @@
           <a:p>
             <a:fld id="{336211AB-35C1-4A8D-948B-57E0E9B10953}" type="datetimeFigureOut">
               <a:rPr lang="en-GB" smtClean="0"/>
-              <a:t>19/03/2019</a:t>
+              <a:t>20/03/2019</a:t>
             </a:fld>
             <a:endParaRPr lang="en-GB"/>
           </a:p>
@@ -1250,7 +1250,7 @@
           <a:p>
             <a:fld id="{336211AB-35C1-4A8D-948B-57E0E9B10953}" type="datetimeFigureOut">
               <a:rPr lang="en-GB" smtClean="0"/>
-              <a:t>19/03/2019</a:t>
+              <a:t>20/03/2019</a:t>
             </a:fld>
             <a:endParaRPr lang="en-GB"/>
           </a:p>
@@ -1617,7 +1617,7 @@
           <a:p>
             <a:fld id="{336211AB-35C1-4A8D-948B-57E0E9B10953}" type="datetimeFigureOut">
               <a:rPr lang="en-GB" smtClean="0"/>
-              <a:t>19/03/2019</a:t>
+              <a:t>20/03/2019</a:t>
             </a:fld>
             <a:endParaRPr lang="en-GB"/>
           </a:p>
@@ -1735,7 +1735,7 @@
           <a:p>
             <a:fld id="{336211AB-35C1-4A8D-948B-57E0E9B10953}" type="datetimeFigureOut">
               <a:rPr lang="en-GB" smtClean="0"/>
-              <a:t>19/03/2019</a:t>
+              <a:t>20/03/2019</a:t>
             </a:fld>
             <a:endParaRPr lang="en-GB"/>
           </a:p>
@@ -1830,7 +1830,7 @@
           <a:p>
             <a:fld id="{336211AB-35C1-4A8D-948B-57E0E9B10953}" type="datetimeFigureOut">
               <a:rPr lang="en-GB" smtClean="0"/>
-              <a:t>19/03/2019</a:t>
+              <a:t>20/03/2019</a:t>
             </a:fld>
             <a:endParaRPr lang="en-GB"/>
           </a:p>
@@ -2107,7 +2107,7 @@
           <a:p>
             <a:fld id="{336211AB-35C1-4A8D-948B-57E0E9B10953}" type="datetimeFigureOut">
               <a:rPr lang="en-GB" smtClean="0"/>
-              <a:t>19/03/2019</a:t>
+              <a:t>20/03/2019</a:t>
             </a:fld>
             <a:endParaRPr lang="en-GB"/>
           </a:p>
@@ -2364,7 +2364,7 @@
           <a:p>
             <a:fld id="{336211AB-35C1-4A8D-948B-57E0E9B10953}" type="datetimeFigureOut">
               <a:rPr lang="en-GB" smtClean="0"/>
-              <a:t>19/03/2019</a:t>
+              <a:t>20/03/2019</a:t>
             </a:fld>
             <a:endParaRPr lang="en-GB"/>
           </a:p>
@@ -2577,7 +2577,7 @@
           <a:p>
             <a:fld id="{336211AB-35C1-4A8D-948B-57E0E9B10953}" type="datetimeFigureOut">
               <a:rPr lang="en-GB" smtClean="0"/>
-              <a:t>19/03/2019</a:t>
+              <a:t>20/03/2019</a:t>
             </a:fld>
             <a:endParaRPr lang="en-GB"/>
           </a:p>
@@ -3058,8 +3058,8 @@
         </p:nvSpPr>
         <p:spPr>
           <a:xfrm>
-            <a:off x="6248400" y="1564148"/>
-            <a:ext cx="2164695" cy="369332"/>
+            <a:off x="6394704" y="1236447"/>
+            <a:ext cx="2234201" cy="923330"/>
           </a:xfrm>
           <a:prstGeom prst="rect">
             <a:avLst/>
@@ -3078,7 +3078,45 @@
                   <a:schemeClr val="bg1"/>
                 </a:solidFill>
               </a:rPr>
-              <a:t>Trigger pulse shaping</a:t>
+              <a:t>Trigger pulse </a:t>
+            </a:r>
+            <a:r>
+              <a:rPr lang="en-GB" dirty="0" smtClean="0">
+                <a:solidFill>
+                  <a:schemeClr val="bg1"/>
+                </a:solidFill>
+              </a:rPr>
+              <a:t>shaping</a:t>
+            </a:r>
+            <a:br>
+              <a:rPr lang="en-GB" dirty="0" smtClean="0">
+                <a:solidFill>
+                  <a:schemeClr val="bg1"/>
+                </a:solidFill>
+              </a:rPr>
+            </a:br>
+            <a:r>
+              <a:rPr lang="en-GB" dirty="0" smtClean="0">
+                <a:solidFill>
+                  <a:schemeClr val="bg1"/>
+                </a:solidFill>
+              </a:rPr>
+              <a:t>for trigger compatible</a:t>
+            </a:r>
+            <a:br>
+              <a:rPr lang="en-GB" dirty="0" smtClean="0">
+                <a:solidFill>
+                  <a:schemeClr val="bg1"/>
+                </a:solidFill>
+              </a:rPr>
+            </a:br>
+            <a:r>
+              <a:rPr lang="en-GB" dirty="0" smtClean="0">
+                <a:solidFill>
+                  <a:schemeClr val="bg1"/>
+                </a:solidFill>
+              </a:rPr>
+              <a:t>with flash ADC</a:t>
             </a:r>
             <a:endParaRPr lang="en-GB" dirty="0">
               <a:solidFill>
@@ -3096,8 +3134,8 @@
         </p:nvSpPr>
         <p:spPr>
           <a:xfrm>
-            <a:off x="5992368" y="3754612"/>
-            <a:ext cx="1716880" cy="369332"/>
+            <a:off x="5913120" y="3661691"/>
+            <a:ext cx="2071144" cy="646331"/>
           </a:xfrm>
           <a:prstGeom prst="rect">
             <a:avLst/>
@@ -3111,12 +3149,59 @@
           <a:lstStyle/>
           <a:p>
             <a:r>
+              <a:rPr lang="en-GB" dirty="0">
+                <a:solidFill>
+                  <a:schemeClr val="bg1"/>
+                </a:solidFill>
+              </a:rPr>
+              <a:t>9</a:t>
+            </a:r>
+            <a:r>
               <a:rPr lang="en-GB" dirty="0" smtClean="0">
                 <a:solidFill>
                   <a:schemeClr val="bg1"/>
                 </a:solidFill>
               </a:rPr>
-              <a:t>LV power supply</a:t>
+              <a:t> V </a:t>
+            </a:r>
+            <a:r>
+              <a:rPr lang="en-GB" dirty="0" smtClean="0">
+                <a:solidFill>
+                  <a:schemeClr val="bg1"/>
+                </a:solidFill>
+              </a:rPr>
+              <a:t>LV </a:t>
+            </a:r>
+            <a:r>
+              <a:rPr lang="en-GB" dirty="0" smtClean="0">
+                <a:solidFill>
+                  <a:schemeClr val="bg1"/>
+                </a:solidFill>
+              </a:rPr>
+              <a:t>power </a:t>
+            </a:r>
+            <a:r>
+              <a:rPr lang="en-GB" dirty="0" smtClean="0">
+                <a:solidFill>
+                  <a:schemeClr val="bg1"/>
+                </a:solidFill>
+              </a:rPr>
+              <a:t>supply</a:t>
+            </a:r>
+            <a:br>
+              <a:rPr lang="en-GB" dirty="0" smtClean="0">
+                <a:solidFill>
+                  <a:schemeClr val="bg1"/>
+                </a:solidFill>
+              </a:rPr>
+            </a:br>
+            <a:r>
+              <a:rPr lang="en-GB" dirty="0" smtClean="0">
+                <a:solidFill>
+                  <a:schemeClr val="bg1"/>
+                </a:solidFill>
+              </a:rPr>
+              <a:t>(digital electronics)</a:t>
             </a:r>
             <a:endParaRPr lang="en-GB" dirty="0">
               <a:solidFill>
@@ -3134,8 +3219,8 @@
         </p:nvSpPr>
         <p:spPr>
           <a:xfrm>
-            <a:off x="6047232" y="5156692"/>
-            <a:ext cx="1716880" cy="369332"/>
+            <a:off x="5913120" y="5092035"/>
+            <a:ext cx="2188163" cy="646331"/>
           </a:xfrm>
           <a:prstGeom prst="rect">
             <a:avLst/>
@@ -3154,7 +3239,33 @@
                   <a:schemeClr val="bg1"/>
                 </a:solidFill>
               </a:rPr>
-              <a:t>LV power supply</a:t>
+              <a:t>28 V LV </a:t>
+            </a:r>
+            <a:r>
+              <a:rPr lang="en-GB" dirty="0" smtClean="0">
+                <a:solidFill>
+                  <a:schemeClr val="bg1"/>
+                </a:solidFill>
+              </a:rPr>
+              <a:t>power </a:t>
+            </a:r>
+            <a:r>
+              <a:rPr lang="en-GB" dirty="0" smtClean="0">
+                <a:solidFill>
+                  <a:schemeClr val="bg1"/>
+                </a:solidFill>
+              </a:rPr>
+              <a:t>supply</a:t>
+            </a:r>
+          </a:p>
+          <a:p>
+            <a:r>
+              <a:rPr lang="en-GB" dirty="0" smtClean="0">
+                <a:solidFill>
+                  <a:schemeClr val="bg1"/>
+                </a:solidFill>
+              </a:rPr>
+              <a:t>(LED driver)</a:t>
             </a:r>
             <a:endParaRPr lang="en-GB" dirty="0">
               <a:solidFill>
@@ -3172,8 +3283,8 @@
         </p:nvSpPr>
         <p:spPr>
           <a:xfrm>
-            <a:off x="7217664" y="454293"/>
-            <a:ext cx="847796" cy="369332"/>
+            <a:off x="7330747" y="509002"/>
+            <a:ext cx="899990" cy="646331"/>
           </a:xfrm>
           <a:prstGeom prst="rect">
             <a:avLst/>
@@ -3192,7 +3303,25 @@
                   <a:schemeClr val="bg1"/>
                 </a:solidFill>
               </a:rPr>
-              <a:t>LV fuse</a:t>
+              <a:t>LV </a:t>
+            </a:r>
+            <a:r>
+              <a:rPr lang="en-GB" dirty="0" smtClean="0">
+                <a:solidFill>
+                  <a:schemeClr val="bg1"/>
+                </a:solidFill>
+              </a:rPr>
+              <a:t>fuse</a:t>
+            </a:r>
+          </a:p>
+          <a:p>
+            <a:r>
+              <a:rPr lang="en-GB" dirty="0" smtClean="0">
+                <a:solidFill>
+                  <a:schemeClr val="bg1"/>
+                </a:solidFill>
+              </a:rPr>
+              <a:t>(digital)</a:t>
             </a:r>
             <a:endParaRPr lang="en-GB" dirty="0">
               <a:solidFill>
@@ -3210,8 +3339,8 @@
         </p:nvSpPr>
         <p:spPr>
           <a:xfrm>
-            <a:off x="6482951" y="454293"/>
-            <a:ext cx="847796" cy="369332"/>
+            <a:off x="6248400" y="509002"/>
+            <a:ext cx="1189749" cy="646331"/>
           </a:xfrm>
           <a:prstGeom prst="rect">
             <a:avLst/>
@@ -3224,13 +3353,37 @@
           </a:bodyPr>
           <a:lstStyle/>
           <a:p>
+            <a:pPr algn="ctr"/>
             <a:r>
               <a:rPr lang="en-GB" dirty="0" smtClean="0">
                 <a:solidFill>
                   <a:schemeClr val="bg1"/>
                 </a:solidFill>
               </a:rPr>
-              <a:t>LV fuse</a:t>
+              <a:t>LV </a:t>
+            </a:r>
+            <a:r>
+              <a:rPr lang="en-GB" dirty="0" smtClean="0">
+                <a:solidFill>
+                  <a:schemeClr val="bg1"/>
+                </a:solidFill>
+              </a:rPr>
+              <a:t>fuse</a:t>
+            </a:r>
+            <a:br>
+              <a:rPr lang="en-GB" dirty="0" smtClean="0">
+                <a:solidFill>
+                  <a:schemeClr val="bg1"/>
+                </a:solidFill>
+              </a:rPr>
+            </a:br>
+            <a:r>
+              <a:rPr lang="en-GB" dirty="0" smtClean="0">
+                <a:solidFill>
+                  <a:schemeClr val="bg1"/>
+                </a:solidFill>
+              </a:rPr>
+              <a:t>(analogue)</a:t>
             </a:r>
             <a:endParaRPr lang="en-GB" dirty="0">
               <a:solidFill>
@@ -3391,6 +3544,97 @@
                 </a:solidFill>
               </a:rPr>
               <a:t>Trigger out</a:t>
+            </a:r>
+            <a:endParaRPr lang="en-GB" dirty="0">
+              <a:solidFill>
+                <a:schemeClr val="bg1"/>
+              </a:solidFill>
+            </a:endParaRPr>
+          </a:p>
+        </p:txBody>
+      </p:sp>
+      <p:sp>
+        <p:nvSpPr>
+          <p:cNvPr id="15" name="TextBox 14"/>
+          <p:cNvSpPr txBox="1"/>
+          <p:nvPr/>
+        </p:nvSpPr>
+        <p:spPr>
+          <a:xfrm>
+            <a:off x="3545881" y="3541064"/>
+            <a:ext cx="2152641" cy="646331"/>
+          </a:xfrm>
+          <a:prstGeom prst="rect">
+            <a:avLst/>
+          </a:prstGeom>
+          <a:noFill/>
+        </p:spPr>
+        <p:txBody>
+          <a:bodyPr wrap="none" rtlCol="0">
+            <a:spAutoFit/>
+          </a:bodyPr>
+          <a:lstStyle/>
+          <a:p>
+            <a:r>
+              <a:rPr lang="en-GB" dirty="0" smtClean="0">
+                <a:solidFill>
+                  <a:schemeClr val="bg1"/>
+                </a:solidFill>
+              </a:rPr>
+              <a:t>5 V (from 9 V supply)</a:t>
+            </a:r>
+            <a:br>
+              <a:rPr lang="en-GB" dirty="0" smtClean="0">
+                <a:solidFill>
+                  <a:schemeClr val="bg1"/>
+                </a:solidFill>
+              </a:rPr>
+            </a:br>
+            <a:r>
+              <a:rPr lang="en-GB" dirty="0" smtClean="0">
+                <a:solidFill>
+                  <a:schemeClr val="bg1"/>
+                </a:solidFill>
+              </a:rPr>
+              <a:t>for raspberry pi) </a:t>
+            </a:r>
+            <a:endParaRPr lang="en-GB" dirty="0">
+              <a:solidFill>
+                <a:schemeClr val="bg1"/>
+              </a:solidFill>
+            </a:endParaRPr>
+          </a:p>
+        </p:txBody>
+      </p:sp>
+      <p:sp>
+        <p:nvSpPr>
+          <p:cNvPr id="16" name="TextBox 15"/>
+          <p:cNvSpPr txBox="1"/>
+          <p:nvPr/>
+        </p:nvSpPr>
+        <p:spPr>
+          <a:xfrm>
+            <a:off x="3218826" y="139670"/>
+            <a:ext cx="2834622" cy="369332"/>
+          </a:xfrm>
+          <a:prstGeom prst="rect">
+            <a:avLst/>
+          </a:prstGeom>
+          <a:noFill/>
+        </p:spPr>
+        <p:txBody>
+          <a:bodyPr wrap="none" rtlCol="0">
+            <a:spAutoFit/>
+          </a:bodyPr>
+          <a:lstStyle/>
+          <a:p>
+            <a:r>
+              <a:rPr lang="en-GB" dirty="0" smtClean="0">
+                <a:solidFill>
+                  <a:schemeClr val="bg1"/>
+                </a:solidFill>
+              </a:rPr>
+              <a:t>Connectors for branches 1-6</a:t>
             </a:r>
             <a:endParaRPr lang="en-GB" dirty="0">
               <a:solidFill>

</xml_diff>